<commit_message>
Git Fail and Win
Removing commented token from getBotID.py (I'm an idiot).
Presentation updated with new GitHub URL
</commit_message>
<xml_diff>
--- a/FadecandySlackbot.pptx
+++ b/FadecandySlackbot.pptx
@@ -5,7 +5,7 @@
     <p:sldMasterId id="2147483648" r:id="rId1"/>
   </p:sldMasterIdLst>
   <p:notesMasterIdLst>
-    <p:notesMasterId r:id="rId25"/>
+    <p:notesMasterId r:id="rId26"/>
   </p:notesMasterIdLst>
   <p:sldIdLst>
     <p:sldId id="256" r:id="rId2"/>
@@ -30,7 +30,8 @@
     <p:sldId id="277" r:id="rId21"/>
     <p:sldId id="278" r:id="rId22"/>
     <p:sldId id="279" r:id="rId23"/>
-    <p:sldId id="270" r:id="rId24"/>
+    <p:sldId id="280" r:id="rId24"/>
+    <p:sldId id="270" r:id="rId25"/>
   </p:sldIdLst>
   <p:sldSz cx="9144000" cy="6858000" type="screen4x3"/>
   <p:notesSz cx="6858000" cy="9144000"/>
@@ -214,7 +215,7 @@
           <a:p>
             <a:fld id="{FF7C6DE3-6ACE-4049-8537-A4C5863626E7}" type="datetimeFigureOut">
               <a:rPr lang="en-US" smtClean="0"/>
-              <a:t>8/15/2016</a:t>
+              <a:t>8/16/2016</a:t>
             </a:fld>
             <a:endParaRPr lang="en-US"/>
           </a:p>
@@ -777,7 +778,7 @@
           <a:p>
             <a:fld id="{E0F6672D-645E-4312-9E9F-5B2CE9FEE731}" type="datetimeFigureOut">
               <a:rPr lang="en-US" smtClean="0"/>
-              <a:t>8/15/2016</a:t>
+              <a:t>8/16/2016</a:t>
             </a:fld>
             <a:endParaRPr lang="en-US"/>
           </a:p>
@@ -935,7 +936,7 @@
           <a:p>
             <a:fld id="{E0F6672D-645E-4312-9E9F-5B2CE9FEE731}" type="datetimeFigureOut">
               <a:rPr lang="en-US" smtClean="0"/>
-              <a:t>8/15/2016</a:t>
+              <a:t>8/16/2016</a:t>
             </a:fld>
             <a:endParaRPr lang="en-US"/>
           </a:p>
@@ -1115,7 +1116,7 @@
           <a:p>
             <a:fld id="{E0F6672D-645E-4312-9E9F-5B2CE9FEE731}" type="datetimeFigureOut">
               <a:rPr lang="en-US" smtClean="0"/>
-              <a:t>8/15/2016</a:t>
+              <a:t>8/16/2016</a:t>
             </a:fld>
             <a:endParaRPr lang="en-US"/>
           </a:p>
@@ -1575,7 +1576,7 @@
           <a:p>
             <a:fld id="{E0F6672D-645E-4312-9E9F-5B2CE9FEE731}" type="datetimeFigureOut">
               <a:rPr lang="en-US" smtClean="0"/>
-              <a:t>8/15/2016</a:t>
+              <a:t>8/16/2016</a:t>
             </a:fld>
             <a:endParaRPr lang="en-US"/>
           </a:p>
@@ -1863,7 +1864,7 @@
           <a:p>
             <a:fld id="{E0F6672D-645E-4312-9E9F-5B2CE9FEE731}" type="datetimeFigureOut">
               <a:rPr lang="en-US" smtClean="0"/>
-              <a:t>8/15/2016</a:t>
+              <a:t>8/16/2016</a:t>
             </a:fld>
             <a:endParaRPr lang="en-US"/>
           </a:p>
@@ -2285,7 +2286,7 @@
           <a:p>
             <a:fld id="{E0F6672D-645E-4312-9E9F-5B2CE9FEE731}" type="datetimeFigureOut">
               <a:rPr lang="en-US" smtClean="0"/>
-              <a:t>8/15/2016</a:t>
+              <a:t>8/16/2016</a:t>
             </a:fld>
             <a:endParaRPr lang="en-US"/>
           </a:p>
@@ -2403,7 +2404,7 @@
           <a:p>
             <a:fld id="{E0F6672D-645E-4312-9E9F-5B2CE9FEE731}" type="datetimeFigureOut">
               <a:rPr lang="en-US" smtClean="0"/>
-              <a:t>8/15/2016</a:t>
+              <a:t>8/16/2016</a:t>
             </a:fld>
             <a:endParaRPr lang="en-US"/>
           </a:p>
@@ -2498,7 +2499,7 @@
           <a:p>
             <a:fld id="{E0F6672D-645E-4312-9E9F-5B2CE9FEE731}" type="datetimeFigureOut">
               <a:rPr lang="en-US" smtClean="0"/>
-              <a:t>8/15/2016</a:t>
+              <a:t>8/16/2016</a:t>
             </a:fld>
             <a:endParaRPr lang="en-US"/>
           </a:p>
@@ -2775,7 +2776,7 @@
           <a:p>
             <a:fld id="{E0F6672D-645E-4312-9E9F-5B2CE9FEE731}" type="datetimeFigureOut">
               <a:rPr lang="en-US" smtClean="0"/>
-              <a:t>8/15/2016</a:t>
+              <a:t>8/16/2016</a:t>
             </a:fld>
             <a:endParaRPr lang="en-US"/>
           </a:p>
@@ -3028,7 +3029,7 @@
           <a:p>
             <a:fld id="{E0F6672D-645E-4312-9E9F-5B2CE9FEE731}" type="datetimeFigureOut">
               <a:rPr lang="en-US" smtClean="0"/>
-              <a:t>8/15/2016</a:t>
+              <a:t>8/16/2016</a:t>
             </a:fld>
             <a:endParaRPr lang="en-US"/>
           </a:p>
@@ -3241,7 +3242,7 @@
           <a:p>
             <a:fld id="{E0F6672D-645E-4312-9E9F-5B2CE9FEE731}" type="datetimeFigureOut">
               <a:rPr lang="en-US" smtClean="0"/>
-              <a:t>8/15/2016</a:t>
+              <a:t>8/16/2016</a:t>
             </a:fld>
             <a:endParaRPr lang="en-US"/>
           </a:p>
@@ -4546,14 +4547,7 @@
                 <a:latin typeface="Consolas" panose="020B0609020204030204" pitchFamily="49" charset="0"/>
                 <a:cs typeface="Consolas" panose="020B0609020204030204" pitchFamily="49" charset="0"/>
               </a:rPr>
-              <a:t>export </a:t>
-            </a:r>
-            <a:r>
-              <a:rPr lang="en-US" dirty="0" smtClean="0">
-                <a:latin typeface="Consolas" panose="020B0609020204030204" pitchFamily="49" charset="0"/>
-                <a:cs typeface="Consolas" panose="020B0609020204030204" pitchFamily="49" charset="0"/>
-              </a:rPr>
-              <a:t>SLACK_BOT_TOKEN=[token]</a:t>
+              <a:t>export SLACK_BOT_TOKEN=[token]</a:t>
             </a:r>
           </a:p>
         </p:txBody>
@@ -9403,6 +9397,100 @@
           <a:p>
             <a:r>
               <a:rPr lang="en-US" dirty="0" smtClean="0"/>
+              <a:t>Code for Everybody!</a:t>
+            </a:r>
+            <a:endParaRPr lang="en-US" dirty="0"/>
+          </a:p>
+        </p:txBody>
+      </p:sp>
+      <p:sp>
+        <p:nvSpPr>
+          <p:cNvPr id="3" name="Content Placeholder 2"/>
+          <p:cNvSpPr>
+            <a:spLocks noGrp="1"/>
+          </p:cNvSpPr>
+          <p:nvPr>
+            <p:ph idx="1"/>
+          </p:nvPr>
+        </p:nvSpPr>
+        <p:spPr/>
+        <p:txBody>
+          <a:bodyPr/>
+          <a:lstStyle/>
+          <a:p>
+            <a:pPr marL="0" indent="0">
+              <a:buNone/>
+            </a:pPr>
+            <a:endParaRPr lang="en-US" dirty="0" smtClean="0"/>
+          </a:p>
+          <a:p>
+            <a:pPr marL="0" indent="0">
+              <a:buNone/>
+            </a:pPr>
+            <a:endParaRPr lang="en-US" dirty="0"/>
+          </a:p>
+          <a:p>
+            <a:pPr marL="0" indent="0">
+              <a:buNone/>
+            </a:pPr>
+            <a:r>
+              <a:rPr lang="en-US" dirty="0" smtClean="0"/>
+              <a:t>https</a:t>
+            </a:r>
+            <a:r>
+              <a:rPr lang="en-US" dirty="0"/>
+              <a:t>://github.com/Denhac/LightWallSlackbot</a:t>
+            </a:r>
+          </a:p>
+        </p:txBody>
+      </p:sp>
+    </p:spTree>
+    <p:extLst>
+      <p:ext uri="{BB962C8B-B14F-4D97-AF65-F5344CB8AC3E}">
+        <p14:creationId xmlns:p14="http://schemas.microsoft.com/office/powerpoint/2010/main" val="2666642075"/>
+      </p:ext>
+    </p:extLst>
+  </p:cSld>
+  <p:clrMapOvr>
+    <a:masterClrMapping/>
+  </p:clrMapOvr>
+</p:sld>
+</file>
+
+<file path=ppt/slides/slide24.xml><?xml version="1.0" encoding="utf-8"?>
+<p:sld xmlns:a="http://schemas.openxmlformats.org/drawingml/2006/main" xmlns:r="http://schemas.openxmlformats.org/officeDocument/2006/relationships" xmlns:p="http://schemas.openxmlformats.org/presentationml/2006/main">
+  <p:cSld>
+    <p:spTree>
+      <p:nvGrpSpPr>
+        <p:cNvPr id="1" name=""/>
+        <p:cNvGrpSpPr/>
+        <p:nvPr/>
+      </p:nvGrpSpPr>
+      <p:grpSpPr>
+        <a:xfrm>
+          <a:off x="0" y="0"/>
+          <a:ext cx="0" cy="0"/>
+          <a:chOff x="0" y="0"/>
+          <a:chExt cx="0" cy="0"/>
+        </a:xfrm>
+      </p:grpSpPr>
+      <p:sp>
+        <p:nvSpPr>
+          <p:cNvPr id="2" name="Title 1"/>
+          <p:cNvSpPr>
+            <a:spLocks noGrp="1"/>
+          </p:cNvSpPr>
+          <p:nvPr>
+            <p:ph type="title"/>
+          </p:nvPr>
+        </p:nvSpPr>
+        <p:spPr/>
+        <p:txBody>
+          <a:bodyPr/>
+          <a:lstStyle/>
+          <a:p>
+            <a:r>
+              <a:rPr lang="en-US" dirty="0" smtClean="0"/>
               <a:t>References</a:t>
             </a:r>
             <a:endParaRPr lang="en-US" dirty="0"/>
@@ -9899,7 +9987,6 @@
               <a:rPr lang="en-US" dirty="0"/>
               <a:t>3</a:t>
             </a:r>
-            <a:endParaRPr lang="en-US" dirty="0"/>
           </a:p>
         </p:txBody>
       </p:sp>
@@ -10405,7 +10492,6 @@
               <a:rPr lang="en-US" dirty="0"/>
               <a:t>7</a:t>
             </a:r>
-            <a:endParaRPr lang="en-US" dirty="0"/>
           </a:p>
         </p:txBody>
       </p:sp>
@@ -10457,7 +10543,6 @@
               <a:rPr lang="en-US" dirty="0"/>
               <a:t>8</a:t>
             </a:r>
-            <a:endParaRPr lang="en-US" dirty="0"/>
           </a:p>
         </p:txBody>
       </p:sp>
@@ -10509,7 +10594,6 @@
               <a:rPr lang="en-US" dirty="0"/>
               <a:t>9</a:t>
             </a:r>
-            <a:endParaRPr lang="en-US" dirty="0"/>
           </a:p>
         </p:txBody>
       </p:sp>

</xml_diff>